<commit_message>
PPT SUB-ITERACION 4 v1.0.pptx Version final Iteracion3
</commit_message>
<xml_diff>
--- a/ITERACION 3/SUB ITERACION 4/PPT SUB-ITERACION 4 v1.0.pptx
+++ b/ITERACION 3/SUB ITERACION 4/PPT SUB-ITERACION 4 v1.0.pptx
@@ -261,7 +261,7 @@
             <a:pPr>
               <a:defRPr/>
             </a:pPr>
-            <a:fld id="{1FA7A838-9B93-419D-A997-332F8D725BDE}" type="datetimeFigureOut">
+            <a:fld id="{F1821797-16AC-4764-91F5-6AFE1AD5A66E}" type="datetimeFigureOut">
               <a:rPr lang="es-PE"/>
               <a:pPr>
                 <a:defRPr/>
@@ -448,7 +448,7 @@
             <a:pPr>
               <a:defRPr/>
             </a:pPr>
-            <a:fld id="{49F07EB5-0A3C-4EAE-90E9-9B0CBF994F8E}" type="slidenum">
+            <a:fld id="{3BD0CF3B-CDE8-490A-8789-16E2CBE6F004}" type="slidenum">
               <a:rPr lang="es-PE"/>
               <a:pPr>
                 <a:defRPr/>
@@ -682,7 +682,7 @@
               </a:spcAft>
               <a:defRPr/>
             </a:pPr>
-            <a:fld id="{5F4CEE6E-9BA5-4920-A1B1-D358C9D2104B}" type="slidenum">
+            <a:fld id="{BFF53FE3-2307-41EF-B056-DEAFA9DF870C}" type="slidenum">
               <a:rPr lang="es-PE" sz="1200">
                 <a:latin typeface="+mn-lt"/>
               </a:rPr>
@@ -730,7 +730,7 @@
       </p:grpSpPr>
       <p:sp>
         <p:nvSpPr>
-          <p:cNvPr id="36865" name="1 Marcador de imagen de diapositiva"/>
+          <p:cNvPr id="40961" name="1 Marcador de imagen de diapositiva"/>
           <p:cNvSpPr>
             <a:spLocks noGrp="1" noRot="1" noChangeAspect="1" noTextEdit="1"/>
           </p:cNvSpPr>
@@ -752,7 +752,7 @@
       </p:sp>
       <p:sp>
         <p:nvSpPr>
-          <p:cNvPr id="36866" name="2 Marcador de notas"/>
+          <p:cNvPr id="40962" name="2 Marcador de notas"/>
           <p:cNvSpPr>
             <a:spLocks noGrp="1"/>
           </p:cNvSpPr>
@@ -806,7 +806,7 @@
               </a:spcAft>
               <a:defRPr/>
             </a:pPr>
-            <a:fld id="{BFEC2390-121E-4F63-AF34-D4023563F723}" type="slidenum">
+            <a:fld id="{0FE611AE-1847-4CC2-BEBC-B64C9C34569F}" type="slidenum">
               <a:rPr lang="es-PE" sz="1200">
                 <a:latin typeface="+mn-lt"/>
               </a:rPr>
@@ -930,7 +930,7 @@
               </a:spcAft>
               <a:defRPr/>
             </a:pPr>
-            <a:fld id="{16E00674-2132-4728-BF1A-6404B1E05F25}" type="slidenum">
+            <a:fld id="{B5655B3A-D332-4FEF-84CB-86C71B2AD6DC}" type="slidenum">
               <a:rPr lang="es-PE" sz="1200">
                 <a:latin typeface="+mn-lt"/>
               </a:rPr>
@@ -978,7 +978,7 @@
       </p:grpSpPr>
       <p:sp>
         <p:nvSpPr>
-          <p:cNvPr id="51202" name="1 Marcador de imagen de diapositiva"/>
+          <p:cNvPr id="22529" name="1 Marcador de imagen de diapositiva"/>
           <p:cNvSpPr>
             <a:spLocks noGrp="1" noRot="1" noChangeAspect="1" noTextEdit="1"/>
           </p:cNvSpPr>
@@ -1000,7 +1000,7 @@
       </p:sp>
       <p:sp>
         <p:nvSpPr>
-          <p:cNvPr id="51203" name="2 Marcador de notas"/>
+          <p:cNvPr id="22530" name="2 Marcador de notas"/>
           <p:cNvSpPr>
             <a:spLocks noGrp="1"/>
           </p:cNvSpPr>
@@ -1054,7 +1054,7 @@
               </a:spcAft>
               <a:defRPr/>
             </a:pPr>
-            <a:fld id="{F0D25CE6-0B4C-422E-BCBD-8A1CE109C2ED}" type="slidenum">
+            <a:fld id="{C36FACD0-9BEB-46E6-91FB-9C91AFF7B1D1}" type="slidenum">
               <a:rPr lang="es-PE" sz="1200">
                 <a:latin typeface="+mn-lt"/>
               </a:rPr>
@@ -1102,211 +1102,9 @@
       </p:grpSpPr>
       <p:sp>
         <p:nvSpPr>
-          <p:cNvPr id="24577" name="1 Marcador de imagen de diapositiva"/>
+          <p:cNvPr id="28673" name="1 Marcador de imagen de diapositiva"/>
           <p:cNvSpPr>
             <a:spLocks noGrp="1" noRot="1" noChangeAspect="1"/>
-          </p:cNvSpPr>
-          <p:nvPr>
-            <p:ph type="sldImg"/>
-          </p:nvPr>
-        </p:nvSpPr>
-        <p:spPr bwMode="auto">
-          <a:noFill/>
-          <a:ln>
-            <a:solidFill>
-              <a:srgbClr val="000000"/>
-            </a:solidFill>
-            <a:miter lim="800000"/>
-            <a:headEnd/>
-            <a:tailEnd/>
-          </a:ln>
-        </p:spPr>
-      </p:sp>
-      <p:sp>
-        <p:nvSpPr>
-          <p:cNvPr id="24578" name="2 Marcador de notas"/>
-          <p:cNvSpPr>
-            <a:spLocks noGrp="1"/>
-          </p:cNvSpPr>
-          <p:nvPr>
-            <p:ph type="body" idx="1"/>
-          </p:nvPr>
-        </p:nvSpPr>
-        <p:spPr bwMode="auto">
-          <a:noFill/>
-        </p:spPr>
-        <p:txBody>
-          <a:bodyPr wrap="square" numCol="1" anchor="t" anchorCtr="0" compatLnSpc="1">
-            <a:prstTxWarp prst="textNoShape">
-              <a:avLst/>
-            </a:prstTxWarp>
-          </a:bodyPr>
-          <a:lstStyle/>
-          <a:p>
-            <a:endParaRPr lang="es-ES" smtClean="0"/>
-          </a:p>
-        </p:txBody>
-      </p:sp>
-      <p:sp>
-        <p:nvSpPr>
-          <p:cNvPr id="4" name="3 Marcador de número de diapositiva"/>
-          <p:cNvSpPr>
-            <a:spLocks noGrp="1"/>
-          </p:cNvSpPr>
-          <p:nvPr>
-            <p:ph type="sldNum" sz="quarter" idx="5"/>
-          </p:nvPr>
-        </p:nvSpPr>
-        <p:spPr/>
-        <p:txBody>
-          <a:bodyPr/>
-          <a:lstStyle/>
-          <a:p>
-            <a:pPr>
-              <a:defRPr/>
-            </a:pPr>
-            <a:fld id="{CEA9A311-D28B-4312-B389-3E394F0DA0DE}" type="slidenum">
-              <a:rPr lang="es-PE" smtClean="0"/>
-              <a:pPr>
-                <a:defRPr/>
-              </a:pPr>
-              <a:t>10</a:t>
-            </a:fld>
-            <a:endParaRPr lang="es-PE"/>
-          </a:p>
-        </p:txBody>
-      </p:sp>
-    </p:spTree>
-  </p:cSld>
-  <p:clrMapOvr>
-    <a:masterClrMapping/>
-  </p:clrMapOvr>
-</p:notes>
-</file>
-
-<file path=ppt/notesSlides/notesSlide5.xml><?xml version="1.0" encoding="utf-8"?>
-<p:notes xmlns:a="http://schemas.openxmlformats.org/drawingml/2006/main" xmlns:r="http://schemas.openxmlformats.org/officeDocument/2006/relationships" xmlns:p="http://schemas.openxmlformats.org/presentationml/2006/main">
-  <p:cSld>
-    <p:spTree>
-      <p:nvGrpSpPr>
-        <p:cNvPr id="1" name=""/>
-        <p:cNvGrpSpPr/>
-        <p:nvPr/>
-      </p:nvGrpSpPr>
-      <p:grpSpPr>
-        <a:xfrm>
-          <a:off x="0" y="0"/>
-          <a:ext cx="0" cy="0"/>
-          <a:chOff x="0" y="0"/>
-          <a:chExt cx="0" cy="0"/>
-        </a:xfrm>
-      </p:grpSpPr>
-      <p:sp>
-        <p:nvSpPr>
-          <p:cNvPr id="26625" name="1 Marcador de imagen de diapositiva"/>
-          <p:cNvSpPr>
-            <a:spLocks noGrp="1" noRot="1" noChangeAspect="1"/>
-          </p:cNvSpPr>
-          <p:nvPr>
-            <p:ph type="sldImg"/>
-          </p:nvPr>
-        </p:nvSpPr>
-        <p:spPr bwMode="auto">
-          <a:noFill/>
-          <a:ln>
-            <a:solidFill>
-              <a:srgbClr val="000000"/>
-            </a:solidFill>
-            <a:miter lim="800000"/>
-            <a:headEnd/>
-            <a:tailEnd/>
-          </a:ln>
-        </p:spPr>
-      </p:sp>
-      <p:sp>
-        <p:nvSpPr>
-          <p:cNvPr id="26626" name="2 Marcador de notas"/>
-          <p:cNvSpPr>
-            <a:spLocks noGrp="1"/>
-          </p:cNvSpPr>
-          <p:nvPr>
-            <p:ph type="body" idx="1"/>
-          </p:nvPr>
-        </p:nvSpPr>
-        <p:spPr bwMode="auto">
-          <a:noFill/>
-        </p:spPr>
-        <p:txBody>
-          <a:bodyPr wrap="square" numCol="1" anchor="t" anchorCtr="0" compatLnSpc="1">
-            <a:prstTxWarp prst="textNoShape">
-              <a:avLst/>
-            </a:prstTxWarp>
-          </a:bodyPr>
-          <a:lstStyle/>
-          <a:p>
-            <a:endParaRPr lang="es-ES" smtClean="0"/>
-          </a:p>
-        </p:txBody>
-      </p:sp>
-      <p:sp>
-        <p:nvSpPr>
-          <p:cNvPr id="4" name="3 Marcador de número de diapositiva"/>
-          <p:cNvSpPr>
-            <a:spLocks noGrp="1"/>
-          </p:cNvSpPr>
-          <p:nvPr>
-            <p:ph type="sldNum" sz="quarter" idx="5"/>
-          </p:nvPr>
-        </p:nvSpPr>
-        <p:spPr/>
-        <p:txBody>
-          <a:bodyPr/>
-          <a:lstStyle/>
-          <a:p>
-            <a:pPr>
-              <a:defRPr/>
-            </a:pPr>
-            <a:fld id="{25F8B86C-AF60-494D-9E75-659544E58165}" type="slidenum">
-              <a:rPr lang="es-PE" smtClean="0"/>
-              <a:pPr>
-                <a:defRPr/>
-              </a:pPr>
-              <a:t>11</a:t>
-            </a:fld>
-            <a:endParaRPr lang="es-PE"/>
-          </a:p>
-        </p:txBody>
-      </p:sp>
-    </p:spTree>
-  </p:cSld>
-  <p:clrMapOvr>
-    <a:masterClrMapping/>
-  </p:clrMapOvr>
-</p:notes>
-</file>
-
-<file path=ppt/notesSlides/notesSlide6.xml><?xml version="1.0" encoding="utf-8"?>
-<p:notes xmlns:a="http://schemas.openxmlformats.org/drawingml/2006/main" xmlns:r="http://schemas.openxmlformats.org/officeDocument/2006/relationships" xmlns:p="http://schemas.openxmlformats.org/presentationml/2006/main">
-  <p:cSld>
-    <p:spTree>
-      <p:nvGrpSpPr>
-        <p:cNvPr id="1" name=""/>
-        <p:cNvGrpSpPr/>
-        <p:nvPr/>
-      </p:nvGrpSpPr>
-      <p:grpSpPr>
-        <a:xfrm>
-          <a:off x="0" y="0"/>
-          <a:ext cx="0" cy="0"/>
-          <a:chOff x="0" y="0"/>
-          <a:chExt cx="0" cy="0"/>
-        </a:xfrm>
-      </p:grpSpPr>
-      <p:sp>
-        <p:nvSpPr>
-          <p:cNvPr id="28673" name="1 Marcador de imagen de diapositiva"/>
-          <p:cNvSpPr>
-            <a:spLocks noGrp="1" noRot="1" noChangeAspect="1" noTextEdit="1"/>
           </p:cNvSpPr>
           <p:nvPr>
             <p:ph type="sldImg"/>
@@ -1352,52 +1150,29 @@
       <p:sp>
         <p:nvSpPr>
           <p:cNvPr id="4" name="3 Marcador de número de diapositiva"/>
-          <p:cNvSpPr txBox="1">
+          <p:cNvSpPr>
             <a:spLocks noGrp="1"/>
           </p:cNvSpPr>
-          <p:nvPr/>
+          <p:nvPr>
+            <p:ph type="sldNum" sz="quarter" idx="5"/>
+          </p:nvPr>
         </p:nvSpPr>
-        <p:spPr>
-          <a:xfrm>
-            <a:off x="3884613" y="8685213"/>
-            <a:ext cx="2971800" cy="457200"/>
-          </a:xfrm>
-          <a:prstGeom prst="rect">
-            <a:avLst/>
-          </a:prstGeom>
-          <a:noFill/>
-        </p:spPr>
+        <p:spPr/>
         <p:txBody>
-          <a:bodyPr anchor="b"/>
+          <a:bodyPr/>
           <a:lstStyle/>
           <a:p>
-            <a:pPr algn="r" fontAlgn="auto">
-              <a:spcBef>
-                <a:spcPts val="0"/>
-              </a:spcBef>
-              <a:spcAft>
-                <a:spcPts val="0"/>
-              </a:spcAft>
+            <a:pPr>
               <a:defRPr/>
             </a:pPr>
-            <a:fld id="{BCA76253-303B-474D-9ACD-C35993EEF8A1}" type="slidenum">
-              <a:rPr lang="es-PE" sz="1200">
-                <a:latin typeface="+mn-lt"/>
-              </a:rPr>
-              <a:pPr algn="r" fontAlgn="auto">
-                <a:spcBef>
-                  <a:spcPts val="0"/>
-                </a:spcBef>
-                <a:spcAft>
-                  <a:spcPts val="0"/>
-                </a:spcAft>
+            <a:fld id="{4891BC47-4E58-4BD6-9326-70A572D3D884}" type="slidenum">
+              <a:rPr lang="es-PE" smtClean="0"/>
+              <a:pPr>
                 <a:defRPr/>
               </a:pPr>
-              <a:t>12</a:t>
+              <a:t>10</a:t>
             </a:fld>
-            <a:endParaRPr lang="es-PE" sz="1200">
-              <a:latin typeface="+mn-lt"/>
-            </a:endParaRPr>
+            <a:endParaRPr lang="es-PE"/>
           </a:p>
         </p:txBody>
       </p:sp>
@@ -1409,7 +1184,7 @@
 </p:notes>
 </file>
 
-<file path=ppt/notesSlides/notesSlide7.xml><?xml version="1.0" encoding="utf-8"?>
+<file path=ppt/notesSlides/notesSlide5.xml><?xml version="1.0" encoding="utf-8"?>
 <p:notes xmlns:a="http://schemas.openxmlformats.org/drawingml/2006/main" xmlns:r="http://schemas.openxmlformats.org/officeDocument/2006/relationships" xmlns:p="http://schemas.openxmlformats.org/presentationml/2006/main">
   <p:cSld>
     <p:spTree>
@@ -1491,12 +1266,12 @@
             <a:pPr>
               <a:defRPr/>
             </a:pPr>
-            <a:fld id="{1361385F-760A-45EF-AB1F-09820883784D}" type="slidenum">
+            <a:fld id="{3F5B137C-1E58-4356-96C6-4A42540C3C31}" type="slidenum">
               <a:rPr lang="es-PE" smtClean="0"/>
               <a:pPr>
                 <a:defRPr/>
               </a:pPr>
-              <a:t>13</a:t>
+              <a:t>11</a:t>
             </a:fld>
             <a:endParaRPr lang="es-PE"/>
           </a:p>
@@ -1510,7 +1285,7 @@
 </p:notes>
 </file>
 
-<file path=ppt/notesSlides/notesSlide8.xml><?xml version="1.0" encoding="utf-8"?>
+<file path=ppt/notesSlides/notesSlide6.xml><?xml version="1.0" encoding="utf-8"?>
 <p:notes xmlns:a="http://schemas.openxmlformats.org/drawingml/2006/main" xmlns:r="http://schemas.openxmlformats.org/officeDocument/2006/relationships" xmlns:p="http://schemas.openxmlformats.org/presentationml/2006/main">
   <p:cSld>
     <p:spTree>
@@ -1605,7 +1380,7 @@
               </a:spcAft>
               <a:defRPr/>
             </a:pPr>
-            <a:fld id="{8DCD8640-F21C-4D42-BC3A-74846696D78F}" type="slidenum">
+            <a:fld id="{81D4EB6B-01E5-4327-9D6B-16B55264CB28}" type="slidenum">
               <a:rPr lang="es-PE" sz="1200">
                 <a:latin typeface="+mn-lt"/>
               </a:rPr>
@@ -1618,7 +1393,7 @@
                 </a:spcAft>
                 <a:defRPr/>
               </a:pPr>
-              <a:t>14</a:t>
+              <a:t>12</a:t>
             </a:fld>
             <a:endParaRPr lang="es-PE" sz="1200">
               <a:latin typeface="+mn-lt"/>
@@ -1634,7 +1409,7 @@
 </p:notes>
 </file>
 
-<file path=ppt/notesSlides/notesSlide9.xml><?xml version="1.0" encoding="utf-8"?>
+<file path=ppt/notesSlides/notesSlide7.xml><?xml version="1.0" encoding="utf-8"?>
 <p:notes xmlns:a="http://schemas.openxmlformats.org/drawingml/2006/main" xmlns:r="http://schemas.openxmlformats.org/officeDocument/2006/relationships" xmlns:p="http://schemas.openxmlformats.org/presentationml/2006/main">
   <p:cSld>
     <p:spTree>
@@ -1654,6 +1429,107 @@
       <p:sp>
         <p:nvSpPr>
           <p:cNvPr id="34817" name="1 Marcador de imagen de diapositiva"/>
+          <p:cNvSpPr>
+            <a:spLocks noGrp="1" noRot="1" noChangeAspect="1"/>
+          </p:cNvSpPr>
+          <p:nvPr>
+            <p:ph type="sldImg"/>
+          </p:nvPr>
+        </p:nvSpPr>
+        <p:spPr bwMode="auto">
+          <a:noFill/>
+          <a:ln>
+            <a:solidFill>
+              <a:srgbClr val="000000"/>
+            </a:solidFill>
+            <a:miter lim="800000"/>
+            <a:headEnd/>
+            <a:tailEnd/>
+          </a:ln>
+        </p:spPr>
+      </p:sp>
+      <p:sp>
+        <p:nvSpPr>
+          <p:cNvPr id="34818" name="2 Marcador de notas"/>
+          <p:cNvSpPr>
+            <a:spLocks noGrp="1"/>
+          </p:cNvSpPr>
+          <p:nvPr>
+            <p:ph type="body" idx="1"/>
+          </p:nvPr>
+        </p:nvSpPr>
+        <p:spPr bwMode="auto">
+          <a:noFill/>
+        </p:spPr>
+        <p:txBody>
+          <a:bodyPr wrap="square" numCol="1" anchor="t" anchorCtr="0" compatLnSpc="1">
+            <a:prstTxWarp prst="textNoShape">
+              <a:avLst/>
+            </a:prstTxWarp>
+          </a:bodyPr>
+          <a:lstStyle/>
+          <a:p>
+            <a:endParaRPr lang="es-ES" smtClean="0"/>
+          </a:p>
+        </p:txBody>
+      </p:sp>
+      <p:sp>
+        <p:nvSpPr>
+          <p:cNvPr id="4" name="3 Marcador de número de diapositiva"/>
+          <p:cNvSpPr>
+            <a:spLocks noGrp="1"/>
+          </p:cNvSpPr>
+          <p:nvPr>
+            <p:ph type="sldNum" sz="quarter" idx="5"/>
+          </p:nvPr>
+        </p:nvSpPr>
+        <p:spPr/>
+        <p:txBody>
+          <a:bodyPr/>
+          <a:lstStyle/>
+          <a:p>
+            <a:pPr>
+              <a:defRPr/>
+            </a:pPr>
+            <a:fld id="{6F4B9D5B-5CB8-43DA-94AF-7149F2F5F221}" type="slidenum">
+              <a:rPr lang="es-PE" smtClean="0"/>
+              <a:pPr>
+                <a:defRPr/>
+              </a:pPr>
+              <a:t>13</a:t>
+            </a:fld>
+            <a:endParaRPr lang="es-PE"/>
+          </a:p>
+        </p:txBody>
+      </p:sp>
+    </p:spTree>
+  </p:cSld>
+  <p:clrMapOvr>
+    <a:masterClrMapping/>
+  </p:clrMapOvr>
+</p:notes>
+</file>
+
+<file path=ppt/notesSlides/notesSlide8.xml><?xml version="1.0" encoding="utf-8"?>
+<p:notes xmlns:a="http://schemas.openxmlformats.org/drawingml/2006/main" xmlns:r="http://schemas.openxmlformats.org/officeDocument/2006/relationships" xmlns:p="http://schemas.openxmlformats.org/presentationml/2006/main">
+  <p:cSld>
+    <p:spTree>
+      <p:nvGrpSpPr>
+        <p:cNvPr id="1" name=""/>
+        <p:cNvGrpSpPr/>
+        <p:nvPr/>
+      </p:nvGrpSpPr>
+      <p:grpSpPr>
+        <a:xfrm>
+          <a:off x="0" y="0"/>
+          <a:ext cx="0" cy="0"/>
+          <a:chOff x="0" y="0"/>
+          <a:chExt cx="0" cy="0"/>
+        </a:xfrm>
+      </p:grpSpPr>
+      <p:sp>
+        <p:nvSpPr>
+          <p:cNvPr id="36865" name="1 Marcador de imagen de diapositiva"/>
           <p:cNvSpPr>
             <a:spLocks noGrp="1" noRot="1" noChangeAspect="1" noTextEdit="1"/>
           </p:cNvSpPr>
@@ -1675,7 +1551,7 @@
       </p:sp>
       <p:sp>
         <p:nvSpPr>
-          <p:cNvPr id="34818" name="2 Marcador de notas"/>
+          <p:cNvPr id="36866" name="2 Marcador de notas"/>
           <p:cNvSpPr>
             <a:spLocks noGrp="1"/>
           </p:cNvSpPr>
@@ -1729,7 +1605,131 @@
               </a:spcAft>
               <a:defRPr/>
             </a:pPr>
-            <a:fld id="{3D080E9F-E207-4203-9CCF-10AA4D1E4521}" type="slidenum">
+            <a:fld id="{4E09F0FE-84DE-414C-A666-21544BD943E3}" type="slidenum">
+              <a:rPr lang="es-PE" sz="1200">
+                <a:latin typeface="+mn-lt"/>
+              </a:rPr>
+              <a:pPr algn="r" fontAlgn="auto">
+                <a:spcBef>
+                  <a:spcPts val="0"/>
+                </a:spcBef>
+                <a:spcAft>
+                  <a:spcPts val="0"/>
+                </a:spcAft>
+                <a:defRPr/>
+              </a:pPr>
+              <a:t>14</a:t>
+            </a:fld>
+            <a:endParaRPr lang="es-PE" sz="1200">
+              <a:latin typeface="+mn-lt"/>
+            </a:endParaRPr>
+          </a:p>
+        </p:txBody>
+      </p:sp>
+    </p:spTree>
+  </p:cSld>
+  <p:clrMapOvr>
+    <a:masterClrMapping/>
+  </p:clrMapOvr>
+</p:notes>
+</file>
+
+<file path=ppt/notesSlides/notesSlide9.xml><?xml version="1.0" encoding="utf-8"?>
+<p:notes xmlns:a="http://schemas.openxmlformats.org/drawingml/2006/main" xmlns:r="http://schemas.openxmlformats.org/officeDocument/2006/relationships" xmlns:p="http://schemas.openxmlformats.org/presentationml/2006/main">
+  <p:cSld>
+    <p:spTree>
+      <p:nvGrpSpPr>
+        <p:cNvPr id="1" name=""/>
+        <p:cNvGrpSpPr/>
+        <p:nvPr/>
+      </p:nvGrpSpPr>
+      <p:grpSpPr>
+        <a:xfrm>
+          <a:off x="0" y="0"/>
+          <a:ext cx="0" cy="0"/>
+          <a:chOff x="0" y="0"/>
+          <a:chExt cx="0" cy="0"/>
+        </a:xfrm>
+      </p:grpSpPr>
+      <p:sp>
+        <p:nvSpPr>
+          <p:cNvPr id="38913" name="1 Marcador de imagen de diapositiva"/>
+          <p:cNvSpPr>
+            <a:spLocks noGrp="1" noRot="1" noChangeAspect="1" noTextEdit="1"/>
+          </p:cNvSpPr>
+          <p:nvPr>
+            <p:ph type="sldImg"/>
+          </p:nvPr>
+        </p:nvSpPr>
+        <p:spPr bwMode="auto">
+          <a:noFill/>
+          <a:ln>
+            <a:solidFill>
+              <a:srgbClr val="000000"/>
+            </a:solidFill>
+            <a:miter lim="800000"/>
+            <a:headEnd/>
+            <a:tailEnd/>
+          </a:ln>
+        </p:spPr>
+      </p:sp>
+      <p:sp>
+        <p:nvSpPr>
+          <p:cNvPr id="38914" name="2 Marcador de notas"/>
+          <p:cNvSpPr>
+            <a:spLocks noGrp="1"/>
+          </p:cNvSpPr>
+          <p:nvPr>
+            <p:ph type="body" idx="1"/>
+          </p:nvPr>
+        </p:nvSpPr>
+        <p:spPr bwMode="auto">
+          <a:noFill/>
+        </p:spPr>
+        <p:txBody>
+          <a:bodyPr wrap="square" numCol="1" anchor="t" anchorCtr="0" compatLnSpc="1">
+            <a:prstTxWarp prst="textNoShape">
+              <a:avLst/>
+            </a:prstTxWarp>
+          </a:bodyPr>
+          <a:lstStyle/>
+          <a:p>
+            <a:endParaRPr lang="es-ES" smtClean="0"/>
+          </a:p>
+        </p:txBody>
+      </p:sp>
+      <p:sp>
+        <p:nvSpPr>
+          <p:cNvPr id="4" name="3 Marcador de número de diapositiva"/>
+          <p:cNvSpPr txBox="1">
+            <a:spLocks noGrp="1"/>
+          </p:cNvSpPr>
+          <p:nvPr/>
+        </p:nvSpPr>
+        <p:spPr>
+          <a:xfrm>
+            <a:off x="3884613" y="8685213"/>
+            <a:ext cx="2971800" cy="457200"/>
+          </a:xfrm>
+          <a:prstGeom prst="rect">
+            <a:avLst/>
+          </a:prstGeom>
+          <a:noFill/>
+        </p:spPr>
+        <p:txBody>
+          <a:bodyPr anchor="b"/>
+          <a:lstStyle/>
+          <a:p>
+            <a:pPr algn="r" fontAlgn="auto">
+              <a:spcBef>
+                <a:spcPts val="0"/>
+              </a:spcBef>
+              <a:spcAft>
+                <a:spcPts val="0"/>
+              </a:spcAft>
+              <a:defRPr/>
+            </a:pPr>
+            <a:fld id="{2CC598AE-B773-4FA8-A9C1-2B35A788FC17}" type="slidenum">
               <a:rPr lang="es-PE" sz="1200">
                 <a:latin typeface="+mn-lt"/>
               </a:rPr>
@@ -3618,7 +3618,7 @@
             <a:pPr>
               <a:defRPr/>
             </a:pPr>
-            <a:fld id="{AA0633C8-8CC4-450A-9B70-F7A14A5B7884}" type="datetimeFigureOut">
+            <a:fld id="{454B37CD-CD4E-4A84-B762-2B0F9931E555}" type="datetimeFigureOut">
               <a:rPr lang="es-PE"/>
               <a:pPr>
                 <a:defRPr/>
@@ -3677,7 +3677,7 @@
             <a:pPr>
               <a:defRPr/>
             </a:pPr>
-            <a:fld id="{29C9469D-CC18-4AE0-9AED-51781978A7B0}" type="slidenum">
+            <a:fld id="{E2ACED0F-7FD4-4076-8CC0-46C6B7059C09}" type="slidenum">
               <a:rPr lang="es-PE"/>
               <a:pPr>
                 <a:defRPr/>
@@ -3826,7 +3826,7 @@
             <a:pPr>
               <a:defRPr/>
             </a:pPr>
-            <a:fld id="{CC8A6832-D14E-42E3-8E45-256AC951E02A}" type="datetimeFigureOut">
+            <a:fld id="{7F5382D7-AA78-4C2F-8ED0-D7ECBBF95A45}" type="datetimeFigureOut">
               <a:rPr lang="es-PE"/>
               <a:pPr>
                 <a:defRPr/>
@@ -3885,7 +3885,7 @@
             <a:pPr>
               <a:defRPr/>
             </a:pPr>
-            <a:fld id="{F7FD537D-45C8-4F67-9B55-3B31251A1B29}" type="slidenum">
+            <a:fld id="{8DBC00B5-C49E-4461-AF3B-B4FD0DA98AE6}" type="slidenum">
               <a:rPr lang="es-PE"/>
               <a:pPr>
                 <a:defRPr/>
@@ -5731,7 +5731,7 @@
             <a:pPr>
               <a:defRPr/>
             </a:pPr>
-            <a:fld id="{6C0DFAED-9A10-4E36-9D4B-355AE62E7A78}" type="datetimeFigureOut">
+            <a:fld id="{4B394B37-DCF4-43F2-9815-3B9BBE78E311}" type="datetimeFigureOut">
               <a:rPr lang="es-PE"/>
               <a:pPr>
                 <a:defRPr/>
@@ -5790,7 +5790,7 @@
             <a:pPr>
               <a:defRPr/>
             </a:pPr>
-            <a:fld id="{E792A64F-F5B8-4A88-A29A-879CD67E8C0B}" type="slidenum">
+            <a:fld id="{D334D546-9F85-460E-8CF1-AA9155220FCB}" type="slidenum">
               <a:rPr lang="es-PE"/>
               <a:pPr>
                 <a:defRPr/>
@@ -5848,7 +5848,7 @@
             <a:pPr>
               <a:defRPr/>
             </a:pPr>
-            <a:fld id="{C7051D14-4000-4129-9FD2-FC1279D448AC}" type="datetimeFigureOut">
+            <a:fld id="{BBA74B1D-676D-4CF5-887A-2D49F3AFD440}" type="datetimeFigureOut">
               <a:rPr lang="es-PE"/>
               <a:pPr>
                 <a:defRPr/>
@@ -5907,7 +5907,7 @@
             <a:pPr>
               <a:defRPr/>
             </a:pPr>
-            <a:fld id="{0DCFAA38-CD87-4F35-AD8F-86DF710C6624}" type="slidenum">
+            <a:fld id="{410C601F-8282-4BFB-862E-D1E29A76054E}" type="slidenum">
               <a:rPr lang="es-PE"/>
               <a:pPr>
                 <a:defRPr/>
@@ -6040,7 +6040,7 @@
             <a:pPr>
               <a:defRPr/>
             </a:pPr>
-            <a:fld id="{B77F35FF-D610-4363-B463-0A28AF48A6CE}" type="datetimeFigureOut">
+            <a:fld id="{B3BC651E-A49F-488D-9F23-DFA3CE2193A9}" type="datetimeFigureOut">
               <a:rPr lang="es-PE"/>
               <a:pPr>
                 <a:defRPr/>
@@ -6099,7 +6099,7 @@
             <a:pPr>
               <a:defRPr/>
             </a:pPr>
-            <a:fld id="{1AFF96D6-BDE1-48EE-BD82-0274D6366FE2}" type="slidenum">
+            <a:fld id="{D50375D8-F4BB-481C-A079-C38A3AB8EC32}" type="slidenum">
               <a:rPr lang="es-PE"/>
               <a:pPr>
                 <a:defRPr/>
@@ -7957,7 +7957,7 @@
             <a:pPr>
               <a:defRPr/>
             </a:pPr>
-            <a:fld id="{F1DD76F1-A269-4147-8A67-3CC337CAD0AA}" type="datetimeFigureOut">
+            <a:fld id="{5B11693D-4142-4D25-A9D6-C41010B714B7}" type="datetimeFigureOut">
               <a:rPr lang="es-PE"/>
               <a:pPr>
                 <a:defRPr/>
@@ -8016,7 +8016,7 @@
             <a:pPr>
               <a:defRPr/>
             </a:pPr>
-            <a:fld id="{E5FC9BB4-1598-4B9B-A4F4-7664B02B5C73}" type="slidenum">
+            <a:fld id="{5514FBD7-5ECC-483A-92FC-95B73C262177}" type="slidenum">
               <a:rPr lang="es-PE"/>
               <a:pPr>
                 <a:defRPr/>
@@ -8211,7 +8211,7 @@
             <a:pPr>
               <a:defRPr/>
             </a:pPr>
-            <a:fld id="{2AC1160B-01CA-443E-96E0-F346B3FF06A3}" type="datetimeFigureOut">
+            <a:fld id="{CE25678F-A46E-4B25-A9FF-0176CA7DDE17}" type="datetimeFigureOut">
               <a:rPr lang="es-PE"/>
               <a:pPr>
                 <a:defRPr/>
@@ -8270,7 +8270,7 @@
             <a:pPr>
               <a:defRPr/>
             </a:pPr>
-            <a:fld id="{9E180F60-9D70-4EF3-8673-8F4B8338F898}" type="slidenum">
+            <a:fld id="{6FE6F516-4B23-451D-8039-787A207AC24C}" type="slidenum">
               <a:rPr lang="es-PE"/>
               <a:pPr>
                 <a:defRPr/>
@@ -8665,7 +8665,7 @@
             <a:pPr>
               <a:defRPr/>
             </a:pPr>
-            <a:fld id="{EEDB748B-AE5C-4EF5-BEFD-F98401C01099}" type="datetimeFigureOut">
+            <a:fld id="{AFE12D59-87F0-437E-9F28-2D95E819CF5E}" type="datetimeFigureOut">
               <a:rPr lang="es-PE"/>
               <a:pPr>
                 <a:defRPr/>
@@ -8724,7 +8724,7 @@
             <a:pPr>
               <a:defRPr/>
             </a:pPr>
-            <a:fld id="{60AF3941-AAC5-407A-8479-4785EF1DB0A8}" type="slidenum">
+            <a:fld id="{D5DC82FC-3268-421E-90A6-A053D7F24B28}" type="slidenum">
               <a:rPr lang="es-PE"/>
               <a:pPr>
                 <a:defRPr/>
@@ -8805,7 +8805,7 @@
             <a:pPr>
               <a:defRPr/>
             </a:pPr>
-            <a:fld id="{10C5CBA1-5CBD-491A-A862-FA3444473FDB}" type="datetimeFigureOut">
+            <a:fld id="{7412A8E3-1EF9-4268-AF4F-52380B24FB92}" type="datetimeFigureOut">
               <a:rPr lang="es-PE"/>
               <a:pPr>
                 <a:defRPr/>
@@ -8864,7 +8864,7 @@
             <a:pPr>
               <a:defRPr/>
             </a:pPr>
-            <a:fld id="{3DE2DF0B-8B47-4B81-A210-0D497D13CAB9}" type="slidenum">
+            <a:fld id="{D256658E-5C92-47E7-B159-CC129B007501}" type="slidenum">
               <a:rPr lang="es-PE"/>
               <a:pPr>
                 <a:defRPr/>
@@ -10586,7 +10586,7 @@
             <a:pPr>
               <a:defRPr/>
             </a:pPr>
-            <a:fld id="{72979831-3754-4E52-B5C5-21E67C1386EC}" type="datetimeFigureOut">
+            <a:fld id="{6E8EEB96-A2EB-4496-9189-15C3BA79E002}" type="datetimeFigureOut">
               <a:rPr lang="es-PE"/>
               <a:pPr>
                 <a:defRPr/>
@@ -10645,7 +10645,7 @@
             <a:pPr>
               <a:defRPr/>
             </a:pPr>
-            <a:fld id="{E058CBC0-1C84-458E-984A-AA70CEFA470F}" type="slidenum">
+            <a:fld id="{7C880C56-C1BD-4C44-B96B-D0E9C34BCDE1}" type="slidenum">
               <a:rPr lang="es-PE"/>
               <a:pPr>
                 <a:defRPr/>
@@ -12602,7 +12602,7 @@
             <a:pPr>
               <a:defRPr/>
             </a:pPr>
-            <a:fld id="{D0B87DB0-9E81-4829-BE34-EE45D56F8435}" type="datetimeFigureOut">
+            <a:fld id="{B1C8B9AC-FF67-4893-8C7D-41192BA9AEF1}" type="datetimeFigureOut">
               <a:rPr lang="es-PE"/>
               <a:pPr>
                 <a:defRPr/>
@@ -12661,7 +12661,7 @@
             <a:pPr>
               <a:defRPr/>
             </a:pPr>
-            <a:fld id="{A1279C2C-B5C2-4AB3-969D-F1FC2EF9F24D}" type="slidenum">
+            <a:fld id="{CA7908AE-E789-4339-85E7-F967DF7E0D64}" type="slidenum">
               <a:rPr lang="es-PE"/>
               <a:pPr>
                 <a:defRPr/>
@@ -14589,7 +14589,7 @@
             <a:pPr>
               <a:defRPr/>
             </a:pPr>
-            <a:fld id="{1A6F1542-901F-45B0-941C-7B1B619FC55E}" type="datetimeFigureOut">
+            <a:fld id="{66E6E31F-67B2-446D-AE9C-732932A83978}" type="datetimeFigureOut">
               <a:rPr lang="es-PE"/>
               <a:pPr>
                 <a:defRPr/>
@@ -14648,7 +14648,7 @@
             <a:pPr>
               <a:defRPr/>
             </a:pPr>
-            <a:fld id="{F653F83A-0C9B-4EF9-9723-A36729FEC5E9}" type="slidenum">
+            <a:fld id="{E7A6B4A4-045F-4D82-8A98-2556FC3C3BCC}" type="slidenum">
               <a:rPr lang="es-PE"/>
               <a:pPr>
                 <a:defRPr/>
@@ -16437,7 +16437,7 @@
             <a:pPr>
               <a:defRPr/>
             </a:pPr>
-            <a:fld id="{D8F280CC-0A4F-4CE7-9B9A-1A767845D31F}" type="datetimeFigureOut">
+            <a:fld id="{898B1CDF-14AE-49BF-8E74-01E7F2227B26}" type="datetimeFigureOut">
               <a:rPr lang="es-PE"/>
               <a:pPr>
                 <a:defRPr/>
@@ -16534,7 +16534,7 @@
             <a:pPr>
               <a:defRPr/>
             </a:pPr>
-            <a:fld id="{F132EE1C-CC8F-494D-AD66-0FD093FF00CC}" type="slidenum">
+            <a:fld id="{52DF1DAD-198A-4F96-8807-BC092BD8ACE1}" type="slidenum">
               <a:rPr lang="es-PE"/>
               <a:pPr>
                 <a:defRPr/>
@@ -17199,7 +17199,7 @@
       </p:grpSpPr>
       <p:sp>
         <p:nvSpPr>
-          <p:cNvPr id="23553" name="2 Título"/>
+          <p:cNvPr id="27649" name="2 Título"/>
           <p:cNvSpPr txBox="1">
             <a:spLocks/>
           </p:cNvSpPr>
@@ -18000,7 +18000,7 @@
       </p:grpSpPr>
       <p:sp>
         <p:nvSpPr>
-          <p:cNvPr id="25601" name="2 Título"/>
+          <p:cNvPr id="29697" name="2 Título"/>
           <p:cNvSpPr txBox="1">
             <a:spLocks/>
           </p:cNvSpPr>
@@ -18635,7 +18635,7 @@
       </p:grpSpPr>
       <p:sp>
         <p:nvSpPr>
-          <p:cNvPr id="27649" name="2 Título"/>
+          <p:cNvPr id="31745" name="2 Título"/>
           <p:cNvSpPr txBox="1">
             <a:spLocks/>
           </p:cNvSpPr>
@@ -19190,7 +19190,7 @@
       </p:grpSpPr>
       <p:sp>
         <p:nvSpPr>
-          <p:cNvPr id="29697" name="2 Título"/>
+          <p:cNvPr id="33793" name="2 Título"/>
           <p:cNvSpPr txBox="1">
             <a:spLocks/>
           </p:cNvSpPr>
@@ -20234,7 +20234,7 @@
       </p:grpSpPr>
       <p:sp>
         <p:nvSpPr>
-          <p:cNvPr id="31745" name="2 Título"/>
+          <p:cNvPr id="35841" name="2 Título"/>
           <p:cNvSpPr txBox="1">
             <a:spLocks/>
           </p:cNvSpPr>
@@ -21240,7 +21240,7 @@
       </p:grpSpPr>
       <p:sp>
         <p:nvSpPr>
-          <p:cNvPr id="33793" name="2 Título"/>
+          <p:cNvPr id="37889" name="2 Título"/>
           <p:cNvSpPr txBox="1">
             <a:spLocks/>
           </p:cNvSpPr>
@@ -21889,7 +21889,7 @@
       </p:graphicFrame>
       <p:pic>
         <p:nvPicPr>
-          <p:cNvPr id="33802" name="Picture 28"/>
+          <p:cNvPr id="37898" name="Picture 28"/>
           <p:cNvPicPr>
             <a:picLocks noChangeAspect="1" noChangeArrowheads="1"/>
           </p:cNvPicPr>
@@ -21904,7 +21904,7 @@
         </p:blipFill>
         <p:spPr bwMode="auto">
           <a:xfrm>
-            <a:off x="3635375" y="2708275"/>
+            <a:off x="3635375" y="2789238"/>
             <a:ext cx="4610100" cy="1000125"/>
           </a:xfrm>
           <a:prstGeom prst="rect">
@@ -21921,7 +21921,7 @@
       </p:pic>
       <p:pic>
         <p:nvPicPr>
-          <p:cNvPr id="33803" name="Picture 44"/>
+          <p:cNvPr id="37899" name="Picture 44"/>
           <p:cNvPicPr>
             <a:picLocks noChangeAspect="1" noChangeArrowheads="1"/>
           </p:cNvPicPr>
@@ -21985,7 +21985,7 @@
       </p:grpSpPr>
       <p:sp>
         <p:nvSpPr>
-          <p:cNvPr id="35841" name="2 Título"/>
+          <p:cNvPr id="39937" name="2 Título"/>
           <p:cNvSpPr txBox="1">
             <a:spLocks/>
           </p:cNvSpPr>
@@ -22034,7 +22034,7 @@
       </p:sp>
       <p:graphicFrame>
         <p:nvGraphicFramePr>
-          <p:cNvPr id="58393" name="Group 25"/>
+          <p:cNvPr id="39947" name="Group 11"/>
           <p:cNvGraphicFramePr>
             <a:graphicFrameLocks noGrp="1"/>
           </p:cNvGraphicFramePr>
@@ -22042,7 +22042,7 @@
         </p:nvGraphicFramePr>
         <p:xfrm>
           <a:off x="250825" y="1884363"/>
-          <a:ext cx="8642350" cy="4054475"/>
+          <a:ext cx="8642350" cy="4052887"/>
         </p:xfrm>
         <a:graphic>
           <a:graphicData uri="http://schemas.openxmlformats.org/drawingml/2006/table">
@@ -22318,7 +22318,7 @@
                         <a:t>CC_RN012_</a:t>
                       </a:r>
                       <a:r>
-                        <a:rPr kumimoji="0" lang="es-PE" sz="2000" b="1" i="0" u="none" strike="noStrike" cap="none" normalizeH="0" baseline="0" smtClean="0">
+                        <a:rPr kumimoji="0" lang="es-PE" sz="2000" b="0" i="0" u="none" strike="noStrike" cap="none" normalizeH="0" baseline="0" smtClean="0">
                           <a:ln>
                             <a:noFill/>
                           </a:ln>
@@ -22393,7 +22393,7 @@
                         <a:t>CC_RN014_</a:t>
                       </a:r>
                       <a:r>
-                        <a:rPr kumimoji="0" lang="es-PE" sz="2000" b="1" i="0" u="none" strike="noStrike" cap="none" normalizeH="0" baseline="0" smtClean="0">
+                        <a:rPr kumimoji="0" lang="es-PE" sz="2000" b="0" i="0" u="none" strike="noStrike" cap="none" normalizeH="0" baseline="0" smtClean="0">
                           <a:ln>
                             <a:noFill/>
                           </a:ln>
@@ -22536,7 +22536,7 @@
       </p:grpSpPr>
       <p:sp>
         <p:nvSpPr>
-          <p:cNvPr id="37889" name="2 Título"/>
+          <p:cNvPr id="41985" name="2 Título"/>
           <p:cNvSpPr txBox="1">
             <a:spLocks/>
           </p:cNvSpPr>
@@ -22614,7 +22614,7 @@
       </p:grpSpPr>
       <p:sp>
         <p:nvSpPr>
-          <p:cNvPr id="38913" name="2 Título"/>
+          <p:cNvPr id="43009" name="2 Título"/>
           <p:cNvSpPr txBox="1">
             <a:spLocks/>
           </p:cNvSpPr>
@@ -22657,6 +22657,39 @@
           </a:p>
         </p:txBody>
       </p:sp>
+      <p:pic>
+        <p:nvPicPr>
+          <p:cNvPr id="43011" name="Picture 3"/>
+          <p:cNvPicPr>
+            <a:picLocks noChangeAspect="1" noChangeArrowheads="1"/>
+          </p:cNvPicPr>
+          <p:nvPr/>
+        </p:nvPicPr>
+        <p:blipFill>
+          <a:blip r:embed="rId2"/>
+          <a:srcRect t="3600" b="5135"/>
+          <a:stretch>
+            <a:fillRect/>
+          </a:stretch>
+        </p:blipFill>
+        <p:spPr bwMode="auto">
+          <a:xfrm>
+            <a:off x="1116013" y="1196975"/>
+            <a:ext cx="7127875" cy="5597525"/>
+          </a:xfrm>
+          <a:prstGeom prst="rect">
+            <a:avLst/>
+          </a:prstGeom>
+          <a:noFill/>
+          <a:ln w="9525">
+            <a:noFill/>
+            <a:miter lim="800000"/>
+            <a:headEnd/>
+            <a:tailEnd/>
+          </a:ln>
+          <a:effectLst/>
+        </p:spPr>
+      </p:pic>
     </p:spTree>
   </p:cSld>
   <p:clrMapOvr>
@@ -22691,7 +22724,7 @@
       </p:grpSpPr>
       <p:sp>
         <p:nvSpPr>
-          <p:cNvPr id="39937" name="2 Título"/>
+          <p:cNvPr id="44033" name="2 Título"/>
           <p:cNvSpPr txBox="1">
             <a:spLocks/>
           </p:cNvSpPr>
@@ -22736,7 +22769,7 @@
       </p:sp>
       <p:sp>
         <p:nvSpPr>
-          <p:cNvPr id="39939" name="Text Box 3"/>
+          <p:cNvPr id="44034" name="Text Box 3"/>
           <p:cNvSpPr txBox="1">
             <a:spLocks noChangeArrowheads="1"/>
           </p:cNvSpPr>
@@ -22745,7 +22778,7 @@
         <p:spPr bwMode="auto">
           <a:xfrm>
             <a:off x="611188" y="1844675"/>
-            <a:ext cx="7921625" cy="4211638"/>
+            <a:ext cx="7921625" cy="3937000"/>
           </a:xfrm>
           <a:prstGeom prst="rect">
             <a:avLst/>
@@ -22765,22 +22798,42 @@
           <a:lstStyle/>
           <a:p>
             <a:r>
-              <a:rPr lang="es-PE"/>
+              <a:rPr lang="es-PE">
+                <a:solidFill>
+                  <a:srgbClr val="8C2902"/>
+                </a:solidFill>
+                <a:latin typeface="Candara" pitchFamily="34" charset="0"/>
+              </a:rPr>
               <a:t>El esfuerzo sobre el entendimiento del proceso es fundamental, con lo cual se obtiene una visión clara sobre la realización de los casos de uso de negocio. Para ello, en coordinación con los grupos de Gestión de Requerimientos y Gestión de Cambios en Proyectos se descubrió que ellos son quienes nos proporcionan las entradas para el caso de uso de negocio de CC_CU001_Gestionar_Contratos. </a:t>
             </a:r>
           </a:p>
           <a:p>
             <a:r>
-              <a:rPr lang="es-PE"/>
+              <a:rPr lang="es-PE">
+                <a:solidFill>
+                  <a:srgbClr val="8C2902"/>
+                </a:solidFill>
+                <a:latin typeface="Candara" pitchFamily="34" charset="0"/>
+              </a:rPr>
               <a:t>Por otro lado, aprendimos que los casos de uso de negocio deben ser generales y no detallados o modulares, a pesar de esa generalidad, determinamos manejar un caso de uso de negocio por cada escenario particular que lo amerite como: las anomalías y seguimientos a los mismos.</a:t>
             </a:r>
           </a:p>
           <a:p>
             <a:r>
-              <a:rPr lang="es-PE"/>
+              <a:rPr lang="es-PE">
+                <a:solidFill>
+                  <a:srgbClr val="8C2902"/>
+                </a:solidFill>
+                <a:latin typeface="Candara" pitchFamily="34" charset="0"/>
+              </a:rPr>
               <a:t>Finalmente, concluimos que en la fase de requerimientos de software es fundamental tener bien definido y documentado el modelo del negocio, ya que es el input base para poder definir los requerimientos funcionales del software que construiremos en el proyecto y poder cubrir todas las necesidades y requisitos del negocio. </a:t>
             </a:r>
-            <a:endParaRPr lang="es-ES"/>
+            <a:endParaRPr lang="es-ES">
+              <a:solidFill>
+                <a:srgbClr val="8C2902"/>
+              </a:solidFill>
+              <a:latin typeface="Candara" pitchFamily="34" charset="0"/>
+            </a:endParaRPr>
           </a:p>
         </p:txBody>
       </p:sp>
@@ -22863,7 +22916,7 @@
       </p:sp>
       <p:sp>
         <p:nvSpPr>
-          <p:cNvPr id="16387" name="2 Título"/>
+          <p:cNvPr id="16386" name="2 Título"/>
           <p:cNvSpPr>
             <a:spLocks/>
           </p:cNvSpPr>
@@ -22892,22 +22945,34 @@
             <a:pPr algn="ctr"/>
             <a:r>
               <a:rPr lang="es-PE">
+                <a:solidFill>
+                  <a:srgbClr val="8C2902"/>
+                </a:solidFill>
                 <a:latin typeface="Candara" pitchFamily="34" charset="0"/>
               </a:rPr>
               <a:t>El mejoramiento de los procesos de toda organización es beneficioso para el logro de sus objetivos. Esto se obtiene con el uso de herramientas de modelado que permiten estructurar, diseñar y graficar los distintos procesos, subprocesos, reglas de negocio, cadena de valor, y demás componentes que permitan relacionar los artefactos de una manera integral.</a:t>
             </a:r>
             <a:br>
               <a:rPr lang="es-PE">
+                <a:solidFill>
+                  <a:srgbClr val="8C2902"/>
+                </a:solidFill>
                 <a:latin typeface="Candara" pitchFamily="34" charset="0"/>
               </a:rPr>
             </a:br>
             <a:r>
               <a:rPr lang="es-PE">
+                <a:solidFill>
+                  <a:srgbClr val="8C2902"/>
+                </a:solidFill>
                 <a:latin typeface="Candara" pitchFamily="34" charset="0"/>
               </a:rPr>
               <a:t>Por otro lado, conscientes que la organización depende de la fidelidad de sus clientes a través de estrategias que consisten en rentabilizar y obtener el máximo beneficio de los mejores clientes, se hace necesario establecer un adecuado análisis para el Modelamiento del Negocio; así como los procesos y sus respectivas actividades y tareas que permitan satisfacer sus necesidades cada vez más exigentes.</a:t>
             </a:r>
             <a:endParaRPr lang="es-ES">
+              <a:solidFill>
+                <a:srgbClr val="8C2902"/>
+              </a:solidFill>
               <a:latin typeface="Candara" pitchFamily="34" charset="0"/>
             </a:endParaRPr>
           </a:p>
@@ -22947,7 +23012,7 @@
       </p:grpSpPr>
       <p:sp>
         <p:nvSpPr>
-          <p:cNvPr id="40961" name="1 Título"/>
+          <p:cNvPr id="45057" name="1 Título"/>
           <p:cNvSpPr>
             <a:spLocks noGrp="1"/>
           </p:cNvSpPr>
@@ -22976,7 +23041,7 @@
       </p:sp>
       <p:sp>
         <p:nvSpPr>
-          <p:cNvPr id="40962" name="3 CuadroTexto"/>
+          <p:cNvPr id="45058" name="3 CuadroTexto"/>
           <p:cNvSpPr txBox="1">
             <a:spLocks noChangeArrowheads="1"/>
           </p:cNvSpPr>
@@ -23070,7 +23135,7 @@
       </p:sp>
       <p:sp>
         <p:nvSpPr>
-          <p:cNvPr id="40963" name="4 CuadroTexto"/>
+          <p:cNvPr id="45059" name="4 CuadroTexto"/>
           <p:cNvSpPr txBox="1">
             <a:spLocks noChangeArrowheads="1"/>
           </p:cNvSpPr>
@@ -23206,7 +23271,7 @@
         </p:nvGraphicFramePr>
         <p:xfrm>
           <a:off x="1692275" y="2492375"/>
-          <a:ext cx="6210300" cy="3438525"/>
+          <a:ext cx="6210300" cy="3444875"/>
         </p:xfrm>
         <a:graphic>
           <a:graphicData uri="http://schemas.openxmlformats.org/drawingml/2006/table">
@@ -24636,7 +24701,7 @@
         </p:nvGraphicFramePr>
         <p:xfrm>
           <a:off x="1466850" y="1641475"/>
-          <a:ext cx="6210300" cy="5100638"/>
+          <a:ext cx="6210300" cy="5121275"/>
         </p:xfrm>
         <a:graphic>
           <a:graphicData uri="http://schemas.openxmlformats.org/drawingml/2006/table">
@@ -26678,7 +26743,7 @@
       </p:grpSpPr>
       <p:sp>
         <p:nvSpPr>
-          <p:cNvPr id="50178" name="2 Título"/>
+          <p:cNvPr id="21505" name="2 Título"/>
           <p:cNvSpPr txBox="1">
             <a:spLocks/>
           </p:cNvSpPr>
@@ -26731,7 +26796,7 @@
         </p:nvGraphicFramePr>
         <p:xfrm>
           <a:off x="1466850" y="1884363"/>
-          <a:ext cx="6210300" cy="4857750"/>
+          <a:ext cx="6210300" cy="4876800"/>
         </p:xfrm>
         <a:graphic>
           <a:graphicData uri="http://schemas.openxmlformats.org/drawingml/2006/table">
@@ -28678,7 +28743,7 @@
       </p:grpSpPr>
       <p:sp>
         <p:nvSpPr>
-          <p:cNvPr id="21505" name="2 Título"/>
+          <p:cNvPr id="23553" name="2 Título"/>
           <p:cNvSpPr txBox="1">
             <a:spLocks/>
           </p:cNvSpPr>
@@ -28740,7 +28805,7 @@
       </p:sp>
       <p:pic>
         <p:nvPicPr>
-          <p:cNvPr id="21507" name="Picture 3"/>
+          <p:cNvPr id="23554" name="Picture 3"/>
           <p:cNvPicPr>
             <a:picLocks noChangeAspect="1" noChangeArrowheads="1"/>
           </p:cNvPicPr>
@@ -28804,7 +28869,7 @@
       </p:grpSpPr>
       <p:sp>
         <p:nvSpPr>
-          <p:cNvPr id="48130" name="2 Título"/>
+          <p:cNvPr id="24577" name="2 Título"/>
           <p:cNvSpPr txBox="1">
             <a:spLocks/>
           </p:cNvSpPr>
@@ -28866,7 +28931,7 @@
       </p:sp>
       <p:pic>
         <p:nvPicPr>
-          <p:cNvPr id="48132" name="Picture 4"/>
+          <p:cNvPr id="24578" name="Picture 4"/>
           <p:cNvPicPr>
             <a:picLocks noChangeAspect="1" noChangeArrowheads="1"/>
           </p:cNvPicPr>
@@ -28930,7 +28995,7 @@
       </p:grpSpPr>
       <p:sp>
         <p:nvSpPr>
-          <p:cNvPr id="49154" name="2 Título"/>
+          <p:cNvPr id="25601" name="2 Título"/>
           <p:cNvSpPr txBox="1">
             <a:spLocks/>
           </p:cNvSpPr>
@@ -28992,7 +29057,7 @@
       </p:sp>
       <p:pic>
         <p:nvPicPr>
-          <p:cNvPr id="49156" name="Picture 4"/>
+          <p:cNvPr id="25602" name="Picture 4"/>
           <p:cNvPicPr>
             <a:picLocks noChangeAspect="1" noChangeArrowheads="1"/>
           </p:cNvPicPr>
@@ -29056,7 +29121,7 @@
       </p:grpSpPr>
       <p:sp>
         <p:nvSpPr>
-          <p:cNvPr id="22529" name="2 Título"/>
+          <p:cNvPr id="26625" name="2 Título"/>
           <p:cNvSpPr txBox="1">
             <a:spLocks/>
           </p:cNvSpPr>

</xml_diff>